<commit_message>
add animations to ppt
</commit_message>
<xml_diff>
--- a/1. From Data Science to Production with Kotlin/oreilly_from_data_science_to_production_with_kotlin.pptx
+++ b/1. From Data Science to Production with Kotlin/oreilly_from_data_science_to_production_with_kotlin.pptx
@@ -135,6 +135,10 @@
     </p:ext>
   </p:extLst>
 </p:presentation>
+</file>
+
+<file path=ppt/revisionInfo.xml><?xml version="1.0" encoding="utf-8"?>
+<p1510:revInfo xmlns:a="http://schemas.openxmlformats.org/drawingml/2006/main" xmlns:r="http://schemas.openxmlformats.org/officeDocument/2006/relationships" xmlns:p1510="http://schemas.microsoft.com/office/powerpoint/2015/10/main"/>
 </file>
 
 <file path=ppt/notesMasters/notesMaster1.xml><?xml version="1.0" encoding="utf-8"?>
@@ -4445,6 +4449,372 @@
   <p:clrMapOvr>
     <a:masterClrMapping/>
   </p:clrMapOvr>
+  <p:timing>
+    <p:tnLst>
+      <p:par>
+        <p:cTn id="1" dur="indefinite" restart="never" nodeType="tmRoot">
+          <p:childTnLst>
+            <p:seq concurrent="1" nextAc="seek">
+              <p:cTn id="2" dur="indefinite" nodeType="mainSeq">
+                <p:childTnLst>
+                  <p:par>
+                    <p:cTn id="3" fill="hold">
+                      <p:stCondLst>
+                        <p:cond delay="indefinite"/>
+                      </p:stCondLst>
+                      <p:childTnLst>
+                        <p:par>
+                          <p:cTn id="4" fill="hold">
+                            <p:stCondLst>
+                              <p:cond delay="0"/>
+                            </p:stCondLst>
+                            <p:childTnLst>
+                              <p:par>
+                                <p:cTn id="5" presetID="1" presetClass="entr" presetSubtype="0" fill="hold" grpId="0" nodeType="clickEffect">
+                                  <p:stCondLst>
+                                    <p:cond delay="0"/>
+                                  </p:stCondLst>
+                                  <p:childTnLst>
+                                    <p:set>
+                                      <p:cBhvr>
+                                        <p:cTn id="6" dur="1" fill="hold">
+                                          <p:stCondLst>
+                                            <p:cond delay="0"/>
+                                          </p:stCondLst>
+                                        </p:cTn>
+                                        <p:tgtEl>
+                                          <p:spTgt spid="3">
+                                            <p:txEl>
+                                              <p:pRg st="0" end="0"/>
+                                            </p:txEl>
+                                          </p:spTgt>
+                                        </p:tgtEl>
+                                        <p:attrNameLst>
+                                          <p:attrName>style.visibility</p:attrName>
+                                        </p:attrNameLst>
+                                      </p:cBhvr>
+                                      <p:to>
+                                        <p:strVal val="visible"/>
+                                      </p:to>
+                                    </p:set>
+                                  </p:childTnLst>
+                                </p:cTn>
+                              </p:par>
+                              <p:par>
+                                <p:cTn id="7" presetID="1" presetClass="entr" presetSubtype="0" fill="hold" grpId="0" nodeType="withEffect">
+                                  <p:stCondLst>
+                                    <p:cond delay="0"/>
+                                  </p:stCondLst>
+                                  <p:childTnLst>
+                                    <p:set>
+                                      <p:cBhvr>
+                                        <p:cTn id="8" dur="1" fill="hold">
+                                          <p:stCondLst>
+                                            <p:cond delay="0"/>
+                                          </p:stCondLst>
+                                        </p:cTn>
+                                        <p:tgtEl>
+                                          <p:spTgt spid="3">
+                                            <p:txEl>
+                                              <p:pRg st="1" end="1"/>
+                                            </p:txEl>
+                                          </p:spTgt>
+                                        </p:tgtEl>
+                                        <p:attrNameLst>
+                                          <p:attrName>style.visibility</p:attrName>
+                                        </p:attrNameLst>
+                                      </p:cBhvr>
+                                      <p:to>
+                                        <p:strVal val="visible"/>
+                                      </p:to>
+                                    </p:set>
+                                  </p:childTnLst>
+                                </p:cTn>
+                              </p:par>
+                              <p:par>
+                                <p:cTn id="9" presetID="1" presetClass="entr" presetSubtype="0" fill="hold" grpId="0" nodeType="withEffect">
+                                  <p:stCondLst>
+                                    <p:cond delay="0"/>
+                                  </p:stCondLst>
+                                  <p:childTnLst>
+                                    <p:set>
+                                      <p:cBhvr>
+                                        <p:cTn id="10" dur="1" fill="hold">
+                                          <p:stCondLst>
+                                            <p:cond delay="0"/>
+                                          </p:stCondLst>
+                                        </p:cTn>
+                                        <p:tgtEl>
+                                          <p:spTgt spid="3">
+                                            <p:txEl>
+                                              <p:pRg st="2" end="2"/>
+                                            </p:txEl>
+                                          </p:spTgt>
+                                        </p:tgtEl>
+                                        <p:attrNameLst>
+                                          <p:attrName>style.visibility</p:attrName>
+                                        </p:attrNameLst>
+                                      </p:cBhvr>
+                                      <p:to>
+                                        <p:strVal val="visible"/>
+                                      </p:to>
+                                    </p:set>
+                                  </p:childTnLst>
+                                </p:cTn>
+                              </p:par>
+                              <p:par>
+                                <p:cTn id="11" presetID="1" presetClass="entr" presetSubtype="0" fill="hold" grpId="0" nodeType="withEffect">
+                                  <p:stCondLst>
+                                    <p:cond delay="0"/>
+                                  </p:stCondLst>
+                                  <p:childTnLst>
+                                    <p:set>
+                                      <p:cBhvr>
+                                        <p:cTn id="12" dur="1" fill="hold">
+                                          <p:stCondLst>
+                                            <p:cond delay="0"/>
+                                          </p:stCondLst>
+                                        </p:cTn>
+                                        <p:tgtEl>
+                                          <p:spTgt spid="3">
+                                            <p:txEl>
+                                              <p:pRg st="3" end="3"/>
+                                            </p:txEl>
+                                          </p:spTgt>
+                                        </p:tgtEl>
+                                        <p:attrNameLst>
+                                          <p:attrName>style.visibility</p:attrName>
+                                        </p:attrNameLst>
+                                      </p:cBhvr>
+                                      <p:to>
+                                        <p:strVal val="visible"/>
+                                      </p:to>
+                                    </p:set>
+                                  </p:childTnLst>
+                                </p:cTn>
+                              </p:par>
+                            </p:childTnLst>
+                          </p:cTn>
+                        </p:par>
+                      </p:childTnLst>
+                    </p:cTn>
+                  </p:par>
+                  <p:par>
+                    <p:cTn id="13" fill="hold">
+                      <p:stCondLst>
+                        <p:cond delay="indefinite"/>
+                      </p:stCondLst>
+                      <p:childTnLst>
+                        <p:par>
+                          <p:cTn id="14" fill="hold">
+                            <p:stCondLst>
+                              <p:cond delay="0"/>
+                            </p:stCondLst>
+                            <p:childTnLst>
+                              <p:par>
+                                <p:cTn id="15" presetID="1" presetClass="entr" presetSubtype="0" fill="hold" grpId="0" nodeType="clickEffect">
+                                  <p:stCondLst>
+                                    <p:cond delay="0"/>
+                                  </p:stCondLst>
+                                  <p:childTnLst>
+                                    <p:set>
+                                      <p:cBhvr>
+                                        <p:cTn id="16" dur="1" fill="hold">
+                                          <p:stCondLst>
+                                            <p:cond delay="0"/>
+                                          </p:stCondLst>
+                                        </p:cTn>
+                                        <p:tgtEl>
+                                          <p:spTgt spid="3">
+                                            <p:txEl>
+                                              <p:pRg st="4" end="4"/>
+                                            </p:txEl>
+                                          </p:spTgt>
+                                        </p:tgtEl>
+                                        <p:attrNameLst>
+                                          <p:attrName>style.visibility</p:attrName>
+                                        </p:attrNameLst>
+                                      </p:cBhvr>
+                                      <p:to>
+                                        <p:strVal val="visible"/>
+                                      </p:to>
+                                    </p:set>
+                                  </p:childTnLst>
+                                </p:cTn>
+                              </p:par>
+                            </p:childTnLst>
+                          </p:cTn>
+                        </p:par>
+                      </p:childTnLst>
+                    </p:cTn>
+                  </p:par>
+                  <p:par>
+                    <p:cTn id="17" fill="hold">
+                      <p:stCondLst>
+                        <p:cond delay="indefinite"/>
+                      </p:stCondLst>
+                      <p:childTnLst>
+                        <p:par>
+                          <p:cTn id="18" fill="hold">
+                            <p:stCondLst>
+                              <p:cond delay="0"/>
+                            </p:stCondLst>
+                            <p:childTnLst>
+                              <p:par>
+                                <p:cTn id="19" presetID="1" presetClass="entr" presetSubtype="0" fill="hold" grpId="0" nodeType="clickEffect">
+                                  <p:stCondLst>
+                                    <p:cond delay="0"/>
+                                  </p:stCondLst>
+                                  <p:childTnLst>
+                                    <p:set>
+                                      <p:cBhvr>
+                                        <p:cTn id="20" dur="1" fill="hold">
+                                          <p:stCondLst>
+                                            <p:cond delay="0"/>
+                                          </p:stCondLst>
+                                        </p:cTn>
+                                        <p:tgtEl>
+                                          <p:spTgt spid="3">
+                                            <p:txEl>
+                                              <p:pRg st="5" end="5"/>
+                                            </p:txEl>
+                                          </p:spTgt>
+                                        </p:tgtEl>
+                                        <p:attrNameLst>
+                                          <p:attrName>style.visibility</p:attrName>
+                                        </p:attrNameLst>
+                                      </p:cBhvr>
+                                      <p:to>
+                                        <p:strVal val="visible"/>
+                                      </p:to>
+                                    </p:set>
+                                  </p:childTnLst>
+                                </p:cTn>
+                              </p:par>
+                              <p:par>
+                                <p:cTn id="21" presetID="1" presetClass="entr" presetSubtype="0" fill="hold" grpId="0" nodeType="withEffect">
+                                  <p:stCondLst>
+                                    <p:cond delay="0"/>
+                                  </p:stCondLst>
+                                  <p:childTnLst>
+                                    <p:set>
+                                      <p:cBhvr>
+                                        <p:cTn id="22" dur="1" fill="hold">
+                                          <p:stCondLst>
+                                            <p:cond delay="0"/>
+                                          </p:stCondLst>
+                                        </p:cTn>
+                                        <p:tgtEl>
+                                          <p:spTgt spid="3">
+                                            <p:txEl>
+                                              <p:pRg st="6" end="6"/>
+                                            </p:txEl>
+                                          </p:spTgt>
+                                        </p:tgtEl>
+                                        <p:attrNameLst>
+                                          <p:attrName>style.visibility</p:attrName>
+                                        </p:attrNameLst>
+                                      </p:cBhvr>
+                                      <p:to>
+                                        <p:strVal val="visible"/>
+                                      </p:to>
+                                    </p:set>
+                                  </p:childTnLst>
+                                </p:cTn>
+                              </p:par>
+                              <p:par>
+                                <p:cTn id="23" presetID="1" presetClass="entr" presetSubtype="0" fill="hold" grpId="0" nodeType="withEffect">
+                                  <p:stCondLst>
+                                    <p:cond delay="0"/>
+                                  </p:stCondLst>
+                                  <p:childTnLst>
+                                    <p:set>
+                                      <p:cBhvr>
+                                        <p:cTn id="24" dur="1" fill="hold">
+                                          <p:stCondLst>
+                                            <p:cond delay="0"/>
+                                          </p:stCondLst>
+                                        </p:cTn>
+                                        <p:tgtEl>
+                                          <p:spTgt spid="3">
+                                            <p:txEl>
+                                              <p:pRg st="7" end="7"/>
+                                            </p:txEl>
+                                          </p:spTgt>
+                                        </p:tgtEl>
+                                        <p:attrNameLst>
+                                          <p:attrName>style.visibility</p:attrName>
+                                        </p:attrNameLst>
+                                      </p:cBhvr>
+                                      <p:to>
+                                        <p:strVal val="visible"/>
+                                      </p:to>
+                                    </p:set>
+                                  </p:childTnLst>
+                                </p:cTn>
+                              </p:par>
+                              <p:par>
+                                <p:cTn id="25" presetID="1" presetClass="entr" presetSubtype="0" fill="hold" grpId="0" nodeType="withEffect">
+                                  <p:stCondLst>
+                                    <p:cond delay="0"/>
+                                  </p:stCondLst>
+                                  <p:childTnLst>
+                                    <p:set>
+                                      <p:cBhvr>
+                                        <p:cTn id="26" dur="1" fill="hold">
+                                          <p:stCondLst>
+                                            <p:cond delay="0"/>
+                                          </p:stCondLst>
+                                        </p:cTn>
+                                        <p:tgtEl>
+                                          <p:spTgt spid="3">
+                                            <p:txEl>
+                                              <p:pRg st="8" end="8"/>
+                                            </p:txEl>
+                                          </p:spTgt>
+                                        </p:tgtEl>
+                                        <p:attrNameLst>
+                                          <p:attrName>style.visibility</p:attrName>
+                                        </p:attrNameLst>
+                                      </p:cBhvr>
+                                      <p:to>
+                                        <p:strVal val="visible"/>
+                                      </p:to>
+                                    </p:set>
+                                  </p:childTnLst>
+                                </p:cTn>
+                              </p:par>
+                            </p:childTnLst>
+                          </p:cTn>
+                        </p:par>
+                      </p:childTnLst>
+                    </p:cTn>
+                  </p:par>
+                </p:childTnLst>
+              </p:cTn>
+              <p:prevCondLst>
+                <p:cond evt="onPrev" delay="0">
+                  <p:tgtEl>
+                    <p:sldTgt/>
+                  </p:tgtEl>
+                </p:cond>
+              </p:prevCondLst>
+              <p:nextCondLst>
+                <p:cond evt="onNext" delay="0">
+                  <p:tgtEl>
+                    <p:sldTgt/>
+                  </p:tgtEl>
+                </p:cond>
+              </p:nextCondLst>
+            </p:seq>
+          </p:childTnLst>
+        </p:cTn>
+      </p:par>
+    </p:tnLst>
+    <p:bldLst>
+      <p:bldP spid="3" grpId="0" build="p"/>
+    </p:bldLst>
+  </p:timing>
 </p:sld>
 </file>
 
@@ -4579,6 +4949,199 @@
   <p:clrMapOvr>
     <a:masterClrMapping/>
   </p:clrMapOvr>
+  <p:timing>
+    <p:tnLst>
+      <p:par>
+        <p:cTn id="1" dur="indefinite" restart="never" nodeType="tmRoot">
+          <p:childTnLst>
+            <p:seq concurrent="1" nextAc="seek">
+              <p:cTn id="2" dur="indefinite" nodeType="mainSeq">
+                <p:childTnLst>
+                  <p:par>
+                    <p:cTn id="3" fill="hold">
+                      <p:stCondLst>
+                        <p:cond delay="indefinite"/>
+                      </p:stCondLst>
+                      <p:childTnLst>
+                        <p:par>
+                          <p:cTn id="4" fill="hold">
+                            <p:stCondLst>
+                              <p:cond delay="0"/>
+                            </p:stCondLst>
+                            <p:childTnLst>
+                              <p:par>
+                                <p:cTn id="5" presetID="1" presetClass="entr" presetSubtype="0" fill="hold" grpId="0" nodeType="clickEffect">
+                                  <p:stCondLst>
+                                    <p:cond delay="0"/>
+                                  </p:stCondLst>
+                                  <p:childTnLst>
+                                    <p:set>
+                                      <p:cBhvr>
+                                        <p:cTn id="6" dur="1" fill="hold">
+                                          <p:stCondLst>
+                                            <p:cond delay="0"/>
+                                          </p:stCondLst>
+                                        </p:cTn>
+                                        <p:tgtEl>
+                                          <p:spTgt spid="3">
+                                            <p:txEl>
+                                              <p:pRg st="0" end="0"/>
+                                            </p:txEl>
+                                          </p:spTgt>
+                                        </p:tgtEl>
+                                        <p:attrNameLst>
+                                          <p:attrName>style.visibility</p:attrName>
+                                        </p:attrNameLst>
+                                      </p:cBhvr>
+                                      <p:to>
+                                        <p:strVal val="visible"/>
+                                      </p:to>
+                                    </p:set>
+                                  </p:childTnLst>
+                                </p:cTn>
+                              </p:par>
+                              <p:par>
+                                <p:cTn id="7" presetID="1" presetClass="entr" presetSubtype="0" fill="hold" grpId="0" nodeType="withEffect">
+                                  <p:stCondLst>
+                                    <p:cond delay="0"/>
+                                  </p:stCondLst>
+                                  <p:childTnLst>
+                                    <p:set>
+                                      <p:cBhvr>
+                                        <p:cTn id="8" dur="1" fill="hold">
+                                          <p:stCondLst>
+                                            <p:cond delay="0"/>
+                                          </p:stCondLst>
+                                        </p:cTn>
+                                        <p:tgtEl>
+                                          <p:spTgt spid="3">
+                                            <p:txEl>
+                                              <p:pRg st="1" end="1"/>
+                                            </p:txEl>
+                                          </p:spTgt>
+                                        </p:tgtEl>
+                                        <p:attrNameLst>
+                                          <p:attrName>style.visibility</p:attrName>
+                                        </p:attrNameLst>
+                                      </p:cBhvr>
+                                      <p:to>
+                                        <p:strVal val="visible"/>
+                                      </p:to>
+                                    </p:set>
+                                  </p:childTnLst>
+                                </p:cTn>
+                              </p:par>
+                              <p:par>
+                                <p:cTn id="9" presetID="1" presetClass="entr" presetSubtype="0" fill="hold" grpId="0" nodeType="withEffect">
+                                  <p:stCondLst>
+                                    <p:cond delay="0"/>
+                                  </p:stCondLst>
+                                  <p:childTnLst>
+                                    <p:set>
+                                      <p:cBhvr>
+                                        <p:cTn id="10" dur="1" fill="hold">
+                                          <p:stCondLst>
+                                            <p:cond delay="0"/>
+                                          </p:stCondLst>
+                                        </p:cTn>
+                                        <p:tgtEl>
+                                          <p:spTgt spid="3">
+                                            <p:txEl>
+                                              <p:pRg st="2" end="2"/>
+                                            </p:txEl>
+                                          </p:spTgt>
+                                        </p:tgtEl>
+                                        <p:attrNameLst>
+                                          <p:attrName>style.visibility</p:attrName>
+                                        </p:attrNameLst>
+                                      </p:cBhvr>
+                                      <p:to>
+                                        <p:strVal val="visible"/>
+                                      </p:to>
+                                    </p:set>
+                                  </p:childTnLst>
+                                </p:cTn>
+                              </p:par>
+                            </p:childTnLst>
+                          </p:cTn>
+                        </p:par>
+                      </p:childTnLst>
+                    </p:cTn>
+                  </p:par>
+                  <p:par>
+                    <p:cTn id="11" fill="hold">
+                      <p:stCondLst>
+                        <p:cond delay="indefinite"/>
+                      </p:stCondLst>
+                      <p:childTnLst>
+                        <p:par>
+                          <p:cTn id="12" fill="hold">
+                            <p:stCondLst>
+                              <p:cond delay="0"/>
+                            </p:stCondLst>
+                            <p:childTnLst>
+                              <p:par>
+                                <p:cTn id="13" presetID="1" presetClass="entr" presetSubtype="0" fill="hold" grpId="0" nodeType="clickEffect">
+                                  <p:stCondLst>
+                                    <p:cond delay="0"/>
+                                  </p:stCondLst>
+                                  <p:childTnLst>
+                                    <p:set>
+                                      <p:cBhvr>
+                                        <p:cTn id="14" dur="1" fill="hold">
+                                          <p:stCondLst>
+                                            <p:cond delay="0"/>
+                                          </p:stCondLst>
+                                        </p:cTn>
+                                        <p:tgtEl>
+                                          <p:spTgt spid="3">
+                                            <p:txEl>
+                                              <p:pRg st="3" end="3"/>
+                                            </p:txEl>
+                                          </p:spTgt>
+                                        </p:tgtEl>
+                                        <p:attrNameLst>
+                                          <p:attrName>style.visibility</p:attrName>
+                                        </p:attrNameLst>
+                                      </p:cBhvr>
+                                      <p:to>
+                                        <p:strVal val="visible"/>
+                                      </p:to>
+                                    </p:set>
+                                  </p:childTnLst>
+                                </p:cTn>
+                              </p:par>
+                            </p:childTnLst>
+                          </p:cTn>
+                        </p:par>
+                      </p:childTnLst>
+                    </p:cTn>
+                  </p:par>
+                </p:childTnLst>
+              </p:cTn>
+              <p:prevCondLst>
+                <p:cond evt="onPrev" delay="0">
+                  <p:tgtEl>
+                    <p:sldTgt/>
+                  </p:tgtEl>
+                </p:cond>
+              </p:prevCondLst>
+              <p:nextCondLst>
+                <p:cond evt="onNext" delay="0">
+                  <p:tgtEl>
+                    <p:sldTgt/>
+                  </p:tgtEl>
+                </p:cond>
+              </p:nextCondLst>
+            </p:seq>
+          </p:childTnLst>
+        </p:cTn>
+      </p:par>
+    </p:tnLst>
+    <p:bldLst>
+      <p:bldP spid="3" grpId="0" build="p"/>
+    </p:bldLst>
+  </p:timing>
 </p:sld>
 </file>
 
@@ -7709,7 +8272,7 @@
               <a:t>Created by JetBrains, the creator of </a:t>
             </a:r>
             <a:r>
-              <a:rPr lang="en-US" err="1"/>
+              <a:rPr lang="en-US" dirty="0" err="1"/>
               <a:t>Intellij</a:t>
             </a:r>
             <a:r>
@@ -7798,6 +8361,274 @@
   <p:clrMapOvr>
     <a:masterClrMapping/>
   </p:clrMapOvr>
+  <p:timing>
+    <p:tnLst>
+      <p:par>
+        <p:cTn id="1" dur="indefinite" restart="never" nodeType="tmRoot">
+          <p:childTnLst>
+            <p:seq concurrent="1" nextAc="seek">
+              <p:cTn id="2" dur="indefinite" nodeType="mainSeq">
+                <p:childTnLst>
+                  <p:par>
+                    <p:cTn id="3" fill="hold">
+                      <p:stCondLst>
+                        <p:cond delay="indefinite"/>
+                      </p:stCondLst>
+                      <p:childTnLst>
+                        <p:par>
+                          <p:cTn id="4" fill="hold">
+                            <p:stCondLst>
+                              <p:cond delay="0"/>
+                            </p:stCondLst>
+                            <p:childTnLst>
+                              <p:par>
+                                <p:cTn id="5" presetID="1" presetClass="entr" presetSubtype="0" fill="hold" grpId="0" nodeType="clickEffect">
+                                  <p:stCondLst>
+                                    <p:cond delay="0"/>
+                                  </p:stCondLst>
+                                  <p:childTnLst>
+                                    <p:set>
+                                      <p:cBhvr>
+                                        <p:cTn id="6" dur="1" fill="hold">
+                                          <p:stCondLst>
+                                            <p:cond delay="0"/>
+                                          </p:stCondLst>
+                                        </p:cTn>
+                                        <p:tgtEl>
+                                          <p:spTgt spid="3">
+                                            <p:txEl>
+                                              <p:pRg st="0" end="0"/>
+                                            </p:txEl>
+                                          </p:spTgt>
+                                        </p:tgtEl>
+                                        <p:attrNameLst>
+                                          <p:attrName>style.visibility</p:attrName>
+                                        </p:attrNameLst>
+                                      </p:cBhvr>
+                                      <p:to>
+                                        <p:strVal val="visible"/>
+                                      </p:to>
+                                    </p:set>
+                                  </p:childTnLst>
+                                </p:cTn>
+                              </p:par>
+                              <p:par>
+                                <p:cTn id="7" presetID="1" presetClass="entr" presetSubtype="0" fill="hold" grpId="0" nodeType="withEffect">
+                                  <p:stCondLst>
+                                    <p:cond delay="0"/>
+                                  </p:stCondLst>
+                                  <p:childTnLst>
+                                    <p:set>
+                                      <p:cBhvr>
+                                        <p:cTn id="8" dur="1" fill="hold">
+                                          <p:stCondLst>
+                                            <p:cond delay="0"/>
+                                          </p:stCondLst>
+                                        </p:cTn>
+                                        <p:tgtEl>
+                                          <p:spTgt spid="3">
+                                            <p:txEl>
+                                              <p:pRg st="1" end="1"/>
+                                            </p:txEl>
+                                          </p:spTgt>
+                                        </p:tgtEl>
+                                        <p:attrNameLst>
+                                          <p:attrName>style.visibility</p:attrName>
+                                        </p:attrNameLst>
+                                      </p:cBhvr>
+                                      <p:to>
+                                        <p:strVal val="visible"/>
+                                      </p:to>
+                                    </p:set>
+                                  </p:childTnLst>
+                                </p:cTn>
+                              </p:par>
+                              <p:par>
+                                <p:cTn id="9" presetID="1" presetClass="entr" presetSubtype="0" fill="hold" grpId="0" nodeType="withEffect">
+                                  <p:stCondLst>
+                                    <p:cond delay="0"/>
+                                  </p:stCondLst>
+                                  <p:childTnLst>
+                                    <p:set>
+                                      <p:cBhvr>
+                                        <p:cTn id="10" dur="1" fill="hold">
+                                          <p:stCondLst>
+                                            <p:cond delay="0"/>
+                                          </p:stCondLst>
+                                        </p:cTn>
+                                        <p:tgtEl>
+                                          <p:spTgt spid="3">
+                                            <p:txEl>
+                                              <p:pRg st="2" end="2"/>
+                                            </p:txEl>
+                                          </p:spTgt>
+                                        </p:tgtEl>
+                                        <p:attrNameLst>
+                                          <p:attrName>style.visibility</p:attrName>
+                                        </p:attrNameLst>
+                                      </p:cBhvr>
+                                      <p:to>
+                                        <p:strVal val="visible"/>
+                                      </p:to>
+                                    </p:set>
+                                  </p:childTnLst>
+                                </p:cTn>
+                              </p:par>
+                              <p:par>
+                                <p:cTn id="11" presetID="1" presetClass="entr" presetSubtype="0" fill="hold" grpId="0" nodeType="withEffect">
+                                  <p:stCondLst>
+                                    <p:cond delay="0"/>
+                                  </p:stCondLst>
+                                  <p:childTnLst>
+                                    <p:set>
+                                      <p:cBhvr>
+                                        <p:cTn id="12" dur="1" fill="hold">
+                                          <p:stCondLst>
+                                            <p:cond delay="0"/>
+                                          </p:stCondLst>
+                                        </p:cTn>
+                                        <p:tgtEl>
+                                          <p:spTgt spid="3">
+                                            <p:txEl>
+                                              <p:pRg st="4" end="4"/>
+                                            </p:txEl>
+                                          </p:spTgt>
+                                        </p:tgtEl>
+                                        <p:attrNameLst>
+                                          <p:attrName>style.visibility</p:attrName>
+                                        </p:attrNameLst>
+                                      </p:cBhvr>
+                                      <p:to>
+                                        <p:strVal val="visible"/>
+                                      </p:to>
+                                    </p:set>
+                                  </p:childTnLst>
+                                </p:cTn>
+                              </p:par>
+                              <p:par>
+                                <p:cTn id="13" presetID="1" presetClass="entr" presetSubtype="0" fill="hold" grpId="0" nodeType="withEffect">
+                                  <p:stCondLst>
+                                    <p:cond delay="0"/>
+                                  </p:stCondLst>
+                                  <p:childTnLst>
+                                    <p:set>
+                                      <p:cBhvr>
+                                        <p:cTn id="14" dur="1" fill="hold">
+                                          <p:stCondLst>
+                                            <p:cond delay="0"/>
+                                          </p:stCondLst>
+                                        </p:cTn>
+                                        <p:tgtEl>
+                                          <p:spTgt spid="3">
+                                            <p:txEl>
+                                              <p:pRg st="5" end="5"/>
+                                            </p:txEl>
+                                          </p:spTgt>
+                                        </p:tgtEl>
+                                        <p:attrNameLst>
+                                          <p:attrName>style.visibility</p:attrName>
+                                        </p:attrNameLst>
+                                      </p:cBhvr>
+                                      <p:to>
+                                        <p:strVal val="visible"/>
+                                      </p:to>
+                                    </p:set>
+                                  </p:childTnLst>
+                                </p:cTn>
+                              </p:par>
+                              <p:par>
+                                <p:cTn id="15" presetID="1" presetClass="entr" presetSubtype="0" fill="hold" grpId="0" nodeType="withEffect">
+                                  <p:stCondLst>
+                                    <p:cond delay="0"/>
+                                  </p:stCondLst>
+                                  <p:childTnLst>
+                                    <p:set>
+                                      <p:cBhvr>
+                                        <p:cTn id="16" dur="1" fill="hold">
+                                          <p:stCondLst>
+                                            <p:cond delay="0"/>
+                                          </p:stCondLst>
+                                        </p:cTn>
+                                        <p:tgtEl>
+                                          <p:spTgt spid="3">
+                                            <p:txEl>
+                                              <p:pRg st="6" end="6"/>
+                                            </p:txEl>
+                                          </p:spTgt>
+                                        </p:tgtEl>
+                                        <p:attrNameLst>
+                                          <p:attrName>style.visibility</p:attrName>
+                                        </p:attrNameLst>
+                                      </p:cBhvr>
+                                      <p:to>
+                                        <p:strVal val="visible"/>
+                                      </p:to>
+                                    </p:set>
+                                  </p:childTnLst>
+                                </p:cTn>
+                              </p:par>
+                              <p:par>
+                                <p:cTn id="17" presetID="1" presetClass="entr" presetSubtype="0" fill="hold" grpId="0" nodeType="withEffect">
+                                  <p:stCondLst>
+                                    <p:cond delay="0"/>
+                                  </p:stCondLst>
+                                  <p:childTnLst>
+                                    <p:set>
+                                      <p:cBhvr>
+                                        <p:cTn id="18" dur="1" fill="hold">
+                                          <p:stCondLst>
+                                            <p:cond delay="0"/>
+                                          </p:stCondLst>
+                                        </p:cTn>
+                                        <p:tgtEl>
+                                          <p:spTgt spid="3">
+                                            <p:txEl>
+                                              <p:pRg st="7" end="7"/>
+                                            </p:txEl>
+                                          </p:spTgt>
+                                        </p:tgtEl>
+                                        <p:attrNameLst>
+                                          <p:attrName>style.visibility</p:attrName>
+                                        </p:attrNameLst>
+                                      </p:cBhvr>
+                                      <p:to>
+                                        <p:strVal val="visible"/>
+                                      </p:to>
+                                    </p:set>
+                                  </p:childTnLst>
+                                </p:cTn>
+                              </p:par>
+                            </p:childTnLst>
+                          </p:cTn>
+                        </p:par>
+                      </p:childTnLst>
+                    </p:cTn>
+                  </p:par>
+                </p:childTnLst>
+              </p:cTn>
+              <p:prevCondLst>
+                <p:cond evt="onPrev" delay="0">
+                  <p:tgtEl>
+                    <p:sldTgt/>
+                  </p:tgtEl>
+                </p:cond>
+              </p:prevCondLst>
+              <p:nextCondLst>
+                <p:cond evt="onNext" delay="0">
+                  <p:tgtEl>
+                    <p:sldTgt/>
+                  </p:tgtEl>
+                </p:cond>
+              </p:nextCondLst>
+            </p:seq>
+          </p:childTnLst>
+        </p:cTn>
+      </p:par>
+    </p:tnLst>
+    <p:bldLst>
+      <p:bldP spid="3" grpId="0" build="p"/>
+    </p:bldLst>
+  </p:timing>
 </p:sld>
 </file>
 
@@ -8007,7 +8838,7 @@
         </p:nvSpPr>
         <p:spPr>
           <a:xfrm>
-            <a:off x="1096963" y="1846263"/>
+            <a:off x="1097280" y="1896597"/>
             <a:ext cx="10058400" cy="4392013"/>
           </a:xfrm>
         </p:spPr>
@@ -8170,6 +9001,434 @@
   <p:clrMapOvr>
     <a:masterClrMapping/>
   </p:clrMapOvr>
+  <p:timing>
+    <p:tnLst>
+      <p:par>
+        <p:cTn id="1" dur="indefinite" restart="never" nodeType="tmRoot">
+          <p:childTnLst>
+            <p:seq concurrent="1" nextAc="seek">
+              <p:cTn id="2" dur="indefinite" nodeType="mainSeq">
+                <p:childTnLst>
+                  <p:par>
+                    <p:cTn id="3" fill="hold">
+                      <p:stCondLst>
+                        <p:cond delay="indefinite"/>
+                      </p:stCondLst>
+                      <p:childTnLst>
+                        <p:par>
+                          <p:cTn id="4" fill="hold">
+                            <p:stCondLst>
+                              <p:cond delay="0"/>
+                            </p:stCondLst>
+                            <p:childTnLst>
+                              <p:par>
+                                <p:cTn id="5" presetID="1" presetClass="entr" presetSubtype="0" fill="hold" grpId="0" nodeType="clickEffect">
+                                  <p:stCondLst>
+                                    <p:cond delay="0"/>
+                                  </p:stCondLst>
+                                  <p:childTnLst>
+                                    <p:set>
+                                      <p:cBhvr>
+                                        <p:cTn id="6" dur="1" fill="hold">
+                                          <p:stCondLst>
+                                            <p:cond delay="0"/>
+                                          </p:stCondLst>
+                                        </p:cTn>
+                                        <p:tgtEl>
+                                          <p:spTgt spid="3">
+                                            <p:txEl>
+                                              <p:pRg st="0" end="0"/>
+                                            </p:txEl>
+                                          </p:spTgt>
+                                        </p:tgtEl>
+                                        <p:attrNameLst>
+                                          <p:attrName>style.visibility</p:attrName>
+                                        </p:attrNameLst>
+                                      </p:cBhvr>
+                                      <p:to>
+                                        <p:strVal val="visible"/>
+                                      </p:to>
+                                    </p:set>
+                                  </p:childTnLst>
+                                </p:cTn>
+                              </p:par>
+                              <p:par>
+                                <p:cTn id="7" presetID="1" presetClass="entr" presetSubtype="0" fill="hold" grpId="0" nodeType="withEffect">
+                                  <p:stCondLst>
+                                    <p:cond delay="0"/>
+                                  </p:stCondLst>
+                                  <p:childTnLst>
+                                    <p:set>
+                                      <p:cBhvr>
+                                        <p:cTn id="8" dur="1" fill="hold">
+                                          <p:stCondLst>
+                                            <p:cond delay="0"/>
+                                          </p:stCondLst>
+                                        </p:cTn>
+                                        <p:tgtEl>
+                                          <p:spTgt spid="3">
+                                            <p:txEl>
+                                              <p:pRg st="1" end="1"/>
+                                            </p:txEl>
+                                          </p:spTgt>
+                                        </p:tgtEl>
+                                        <p:attrNameLst>
+                                          <p:attrName>style.visibility</p:attrName>
+                                        </p:attrNameLst>
+                                      </p:cBhvr>
+                                      <p:to>
+                                        <p:strVal val="visible"/>
+                                      </p:to>
+                                    </p:set>
+                                  </p:childTnLst>
+                                </p:cTn>
+                              </p:par>
+                              <p:par>
+                                <p:cTn id="9" presetID="1" presetClass="entr" presetSubtype="0" fill="hold" grpId="0" nodeType="withEffect">
+                                  <p:stCondLst>
+                                    <p:cond delay="0"/>
+                                  </p:stCondLst>
+                                  <p:childTnLst>
+                                    <p:set>
+                                      <p:cBhvr>
+                                        <p:cTn id="10" dur="1" fill="hold">
+                                          <p:stCondLst>
+                                            <p:cond delay="0"/>
+                                          </p:stCondLst>
+                                        </p:cTn>
+                                        <p:tgtEl>
+                                          <p:spTgt spid="3">
+                                            <p:txEl>
+                                              <p:pRg st="2" end="2"/>
+                                            </p:txEl>
+                                          </p:spTgt>
+                                        </p:tgtEl>
+                                        <p:attrNameLst>
+                                          <p:attrName>style.visibility</p:attrName>
+                                        </p:attrNameLst>
+                                      </p:cBhvr>
+                                      <p:to>
+                                        <p:strVal val="visible"/>
+                                      </p:to>
+                                    </p:set>
+                                  </p:childTnLst>
+                                </p:cTn>
+                              </p:par>
+                              <p:par>
+                                <p:cTn id="11" presetID="1" presetClass="entr" presetSubtype="0" fill="hold" grpId="0" nodeType="withEffect">
+                                  <p:stCondLst>
+                                    <p:cond delay="0"/>
+                                  </p:stCondLst>
+                                  <p:childTnLst>
+                                    <p:set>
+                                      <p:cBhvr>
+                                        <p:cTn id="12" dur="1" fill="hold">
+                                          <p:stCondLst>
+                                            <p:cond delay="0"/>
+                                          </p:stCondLst>
+                                        </p:cTn>
+                                        <p:tgtEl>
+                                          <p:spTgt spid="3">
+                                            <p:txEl>
+                                              <p:pRg st="3" end="3"/>
+                                            </p:txEl>
+                                          </p:spTgt>
+                                        </p:tgtEl>
+                                        <p:attrNameLst>
+                                          <p:attrName>style.visibility</p:attrName>
+                                        </p:attrNameLst>
+                                      </p:cBhvr>
+                                      <p:to>
+                                        <p:strVal val="visible"/>
+                                      </p:to>
+                                    </p:set>
+                                  </p:childTnLst>
+                                </p:cTn>
+                              </p:par>
+                              <p:par>
+                                <p:cTn id="13" presetID="1" presetClass="entr" presetSubtype="0" fill="hold" grpId="0" nodeType="withEffect">
+                                  <p:stCondLst>
+                                    <p:cond delay="0"/>
+                                  </p:stCondLst>
+                                  <p:childTnLst>
+                                    <p:set>
+                                      <p:cBhvr>
+                                        <p:cTn id="14" dur="1" fill="hold">
+                                          <p:stCondLst>
+                                            <p:cond delay="0"/>
+                                          </p:stCondLst>
+                                        </p:cTn>
+                                        <p:tgtEl>
+                                          <p:spTgt spid="3">
+                                            <p:txEl>
+                                              <p:pRg st="4" end="4"/>
+                                            </p:txEl>
+                                          </p:spTgt>
+                                        </p:tgtEl>
+                                        <p:attrNameLst>
+                                          <p:attrName>style.visibility</p:attrName>
+                                        </p:attrNameLst>
+                                      </p:cBhvr>
+                                      <p:to>
+                                        <p:strVal val="visible"/>
+                                      </p:to>
+                                    </p:set>
+                                  </p:childTnLst>
+                                </p:cTn>
+                              </p:par>
+                            </p:childTnLst>
+                          </p:cTn>
+                        </p:par>
+                      </p:childTnLst>
+                    </p:cTn>
+                  </p:par>
+                  <p:par>
+                    <p:cTn id="15" fill="hold">
+                      <p:stCondLst>
+                        <p:cond delay="indefinite"/>
+                      </p:stCondLst>
+                      <p:childTnLst>
+                        <p:par>
+                          <p:cTn id="16" fill="hold">
+                            <p:stCondLst>
+                              <p:cond delay="0"/>
+                            </p:stCondLst>
+                            <p:childTnLst>
+                              <p:par>
+                                <p:cTn id="17" presetID="1" presetClass="entr" presetSubtype="0" fill="hold" grpId="0" nodeType="clickEffect">
+                                  <p:stCondLst>
+                                    <p:cond delay="0"/>
+                                  </p:stCondLst>
+                                  <p:childTnLst>
+                                    <p:set>
+                                      <p:cBhvr>
+                                        <p:cTn id="18" dur="1" fill="hold">
+                                          <p:stCondLst>
+                                            <p:cond delay="0"/>
+                                          </p:stCondLst>
+                                        </p:cTn>
+                                        <p:tgtEl>
+                                          <p:spTgt spid="3">
+                                            <p:txEl>
+                                              <p:pRg st="5" end="5"/>
+                                            </p:txEl>
+                                          </p:spTgt>
+                                        </p:tgtEl>
+                                        <p:attrNameLst>
+                                          <p:attrName>style.visibility</p:attrName>
+                                        </p:attrNameLst>
+                                      </p:cBhvr>
+                                      <p:to>
+                                        <p:strVal val="visible"/>
+                                      </p:to>
+                                    </p:set>
+                                  </p:childTnLst>
+                                </p:cTn>
+                              </p:par>
+                              <p:par>
+                                <p:cTn id="19" presetID="1" presetClass="entr" presetSubtype="0" fill="hold" grpId="0" nodeType="withEffect">
+                                  <p:stCondLst>
+                                    <p:cond delay="0"/>
+                                  </p:stCondLst>
+                                  <p:childTnLst>
+                                    <p:set>
+                                      <p:cBhvr>
+                                        <p:cTn id="20" dur="1" fill="hold">
+                                          <p:stCondLst>
+                                            <p:cond delay="0"/>
+                                          </p:stCondLst>
+                                        </p:cTn>
+                                        <p:tgtEl>
+                                          <p:spTgt spid="3">
+                                            <p:txEl>
+                                              <p:pRg st="6" end="6"/>
+                                            </p:txEl>
+                                          </p:spTgt>
+                                        </p:tgtEl>
+                                        <p:attrNameLst>
+                                          <p:attrName>style.visibility</p:attrName>
+                                        </p:attrNameLst>
+                                      </p:cBhvr>
+                                      <p:to>
+                                        <p:strVal val="visible"/>
+                                      </p:to>
+                                    </p:set>
+                                  </p:childTnLst>
+                                </p:cTn>
+                              </p:par>
+                              <p:par>
+                                <p:cTn id="21" presetID="1" presetClass="entr" presetSubtype="0" fill="hold" grpId="0" nodeType="withEffect">
+                                  <p:stCondLst>
+                                    <p:cond delay="0"/>
+                                  </p:stCondLst>
+                                  <p:childTnLst>
+                                    <p:set>
+                                      <p:cBhvr>
+                                        <p:cTn id="22" dur="1" fill="hold">
+                                          <p:stCondLst>
+                                            <p:cond delay="0"/>
+                                          </p:stCondLst>
+                                        </p:cTn>
+                                        <p:tgtEl>
+                                          <p:spTgt spid="3">
+                                            <p:txEl>
+                                              <p:pRg st="7" end="7"/>
+                                            </p:txEl>
+                                          </p:spTgt>
+                                        </p:tgtEl>
+                                        <p:attrNameLst>
+                                          <p:attrName>style.visibility</p:attrName>
+                                        </p:attrNameLst>
+                                      </p:cBhvr>
+                                      <p:to>
+                                        <p:strVal val="visible"/>
+                                      </p:to>
+                                    </p:set>
+                                  </p:childTnLst>
+                                </p:cTn>
+                              </p:par>
+                              <p:par>
+                                <p:cTn id="23" presetID="1" presetClass="entr" presetSubtype="0" fill="hold" grpId="0" nodeType="withEffect">
+                                  <p:stCondLst>
+                                    <p:cond delay="0"/>
+                                  </p:stCondLst>
+                                  <p:childTnLst>
+                                    <p:set>
+                                      <p:cBhvr>
+                                        <p:cTn id="24" dur="1" fill="hold">
+                                          <p:stCondLst>
+                                            <p:cond delay="0"/>
+                                          </p:stCondLst>
+                                        </p:cTn>
+                                        <p:tgtEl>
+                                          <p:spTgt spid="3">
+                                            <p:txEl>
+                                              <p:pRg st="8" end="8"/>
+                                            </p:txEl>
+                                          </p:spTgt>
+                                        </p:tgtEl>
+                                        <p:attrNameLst>
+                                          <p:attrName>style.visibility</p:attrName>
+                                        </p:attrNameLst>
+                                      </p:cBhvr>
+                                      <p:to>
+                                        <p:strVal val="visible"/>
+                                      </p:to>
+                                    </p:set>
+                                  </p:childTnLst>
+                                </p:cTn>
+                              </p:par>
+                              <p:par>
+                                <p:cTn id="25" presetID="1" presetClass="entr" presetSubtype="0" fill="hold" grpId="0" nodeType="withEffect">
+                                  <p:stCondLst>
+                                    <p:cond delay="0"/>
+                                  </p:stCondLst>
+                                  <p:childTnLst>
+                                    <p:set>
+                                      <p:cBhvr>
+                                        <p:cTn id="26" dur="1" fill="hold">
+                                          <p:stCondLst>
+                                            <p:cond delay="0"/>
+                                          </p:stCondLst>
+                                        </p:cTn>
+                                        <p:tgtEl>
+                                          <p:spTgt spid="3">
+                                            <p:txEl>
+                                              <p:pRg st="9" end="9"/>
+                                            </p:txEl>
+                                          </p:spTgt>
+                                        </p:tgtEl>
+                                        <p:attrNameLst>
+                                          <p:attrName>style.visibility</p:attrName>
+                                        </p:attrNameLst>
+                                      </p:cBhvr>
+                                      <p:to>
+                                        <p:strVal val="visible"/>
+                                      </p:to>
+                                    </p:set>
+                                  </p:childTnLst>
+                                </p:cTn>
+                              </p:par>
+                            </p:childTnLst>
+                          </p:cTn>
+                        </p:par>
+                      </p:childTnLst>
+                    </p:cTn>
+                  </p:par>
+                  <p:par>
+                    <p:cTn id="27" fill="hold">
+                      <p:stCondLst>
+                        <p:cond delay="indefinite"/>
+                      </p:stCondLst>
+                      <p:childTnLst>
+                        <p:par>
+                          <p:cTn id="28" fill="hold">
+                            <p:stCondLst>
+                              <p:cond delay="0"/>
+                            </p:stCondLst>
+                            <p:childTnLst>
+                              <p:par>
+                                <p:cTn id="29" presetID="1" presetClass="entr" presetSubtype="0" fill="hold" grpId="0" nodeType="clickEffect">
+                                  <p:stCondLst>
+                                    <p:cond delay="0"/>
+                                  </p:stCondLst>
+                                  <p:childTnLst>
+                                    <p:set>
+                                      <p:cBhvr>
+                                        <p:cTn id="30" dur="1" fill="hold">
+                                          <p:stCondLst>
+                                            <p:cond delay="0"/>
+                                          </p:stCondLst>
+                                        </p:cTn>
+                                        <p:tgtEl>
+                                          <p:spTgt spid="3">
+                                            <p:txEl>
+                                              <p:pRg st="10" end="10"/>
+                                            </p:txEl>
+                                          </p:spTgt>
+                                        </p:tgtEl>
+                                        <p:attrNameLst>
+                                          <p:attrName>style.visibility</p:attrName>
+                                        </p:attrNameLst>
+                                      </p:cBhvr>
+                                      <p:to>
+                                        <p:strVal val="visible"/>
+                                      </p:to>
+                                    </p:set>
+                                  </p:childTnLst>
+                                </p:cTn>
+                              </p:par>
+                            </p:childTnLst>
+                          </p:cTn>
+                        </p:par>
+                      </p:childTnLst>
+                    </p:cTn>
+                  </p:par>
+                </p:childTnLst>
+              </p:cTn>
+              <p:prevCondLst>
+                <p:cond evt="onPrev" delay="0">
+                  <p:tgtEl>
+                    <p:sldTgt/>
+                  </p:tgtEl>
+                </p:cond>
+              </p:prevCondLst>
+              <p:nextCondLst>
+                <p:cond evt="onNext" delay="0">
+                  <p:tgtEl>
+                    <p:sldTgt/>
+                  </p:tgtEl>
+                </p:cond>
+              </p:nextCondLst>
+            </p:seq>
+          </p:childTnLst>
+        </p:cTn>
+      </p:par>
+    </p:tnLst>
+    <p:bldLst>
+      <p:bldP spid="3" grpId="0" build="p"/>
+    </p:bldLst>
+  </p:timing>
 </p:sld>
 </file>
 
@@ -8415,6 +9674,545 @@
   <p:clrMapOvr>
     <a:masterClrMapping/>
   </p:clrMapOvr>
+  <p:timing>
+    <p:tnLst>
+      <p:par>
+        <p:cTn id="1" dur="indefinite" restart="never" nodeType="tmRoot">
+          <p:childTnLst>
+            <p:seq concurrent="1" nextAc="seek">
+              <p:cTn id="2" dur="indefinite" nodeType="mainSeq">
+                <p:childTnLst>
+                  <p:par>
+                    <p:cTn id="3" fill="hold">
+                      <p:stCondLst>
+                        <p:cond delay="indefinite"/>
+                      </p:stCondLst>
+                      <p:childTnLst>
+                        <p:par>
+                          <p:cTn id="4" fill="hold">
+                            <p:stCondLst>
+                              <p:cond delay="0"/>
+                            </p:stCondLst>
+                            <p:childTnLst>
+                              <p:par>
+                                <p:cTn id="5" presetID="1" presetClass="entr" presetSubtype="0" fill="hold" grpId="0" nodeType="clickEffect">
+                                  <p:stCondLst>
+                                    <p:cond delay="0"/>
+                                  </p:stCondLst>
+                                  <p:childTnLst>
+                                    <p:set>
+                                      <p:cBhvr>
+                                        <p:cTn id="6" dur="1" fill="hold">
+                                          <p:stCondLst>
+                                            <p:cond delay="0"/>
+                                          </p:stCondLst>
+                                        </p:cTn>
+                                        <p:tgtEl>
+                                          <p:spTgt spid="3">
+                                            <p:txEl>
+                                              <p:pRg st="0" end="0"/>
+                                            </p:txEl>
+                                          </p:spTgt>
+                                        </p:tgtEl>
+                                        <p:attrNameLst>
+                                          <p:attrName>style.visibility</p:attrName>
+                                        </p:attrNameLst>
+                                      </p:cBhvr>
+                                      <p:to>
+                                        <p:strVal val="visible"/>
+                                      </p:to>
+                                    </p:set>
+                                  </p:childTnLst>
+                                </p:cTn>
+                              </p:par>
+                            </p:childTnLst>
+                          </p:cTn>
+                        </p:par>
+                      </p:childTnLst>
+                    </p:cTn>
+                  </p:par>
+                  <p:par>
+                    <p:cTn id="7" fill="hold">
+                      <p:stCondLst>
+                        <p:cond delay="indefinite"/>
+                      </p:stCondLst>
+                      <p:childTnLst>
+                        <p:par>
+                          <p:cTn id="8" fill="hold">
+                            <p:stCondLst>
+                              <p:cond delay="0"/>
+                            </p:stCondLst>
+                            <p:childTnLst>
+                              <p:par>
+                                <p:cTn id="9" presetID="1" presetClass="entr" presetSubtype="0" fill="hold" grpId="0" nodeType="clickEffect">
+                                  <p:stCondLst>
+                                    <p:cond delay="0"/>
+                                  </p:stCondLst>
+                                  <p:childTnLst>
+                                    <p:set>
+                                      <p:cBhvr>
+                                        <p:cTn id="10" dur="1" fill="hold">
+                                          <p:stCondLst>
+                                            <p:cond delay="0"/>
+                                          </p:stCondLst>
+                                        </p:cTn>
+                                        <p:tgtEl>
+                                          <p:spTgt spid="3">
+                                            <p:txEl>
+                                              <p:pRg st="1" end="1"/>
+                                            </p:txEl>
+                                          </p:spTgt>
+                                        </p:tgtEl>
+                                        <p:attrNameLst>
+                                          <p:attrName>style.visibility</p:attrName>
+                                        </p:attrNameLst>
+                                      </p:cBhvr>
+                                      <p:to>
+                                        <p:strVal val="visible"/>
+                                      </p:to>
+                                    </p:set>
+                                  </p:childTnLst>
+                                </p:cTn>
+                              </p:par>
+                              <p:par>
+                                <p:cTn id="11" presetID="1" presetClass="entr" presetSubtype="0" fill="hold" grpId="0" nodeType="withEffect">
+                                  <p:stCondLst>
+                                    <p:cond delay="0"/>
+                                  </p:stCondLst>
+                                  <p:childTnLst>
+                                    <p:set>
+                                      <p:cBhvr>
+                                        <p:cTn id="12" dur="1" fill="hold">
+                                          <p:stCondLst>
+                                            <p:cond delay="0"/>
+                                          </p:stCondLst>
+                                        </p:cTn>
+                                        <p:tgtEl>
+                                          <p:spTgt spid="3">
+                                            <p:txEl>
+                                              <p:pRg st="2" end="2"/>
+                                            </p:txEl>
+                                          </p:spTgt>
+                                        </p:tgtEl>
+                                        <p:attrNameLst>
+                                          <p:attrName>style.visibility</p:attrName>
+                                        </p:attrNameLst>
+                                      </p:cBhvr>
+                                      <p:to>
+                                        <p:strVal val="visible"/>
+                                      </p:to>
+                                    </p:set>
+                                  </p:childTnLst>
+                                </p:cTn>
+                              </p:par>
+                              <p:par>
+                                <p:cTn id="13" presetID="1" presetClass="entr" presetSubtype="0" fill="hold" grpId="0" nodeType="withEffect">
+                                  <p:stCondLst>
+                                    <p:cond delay="0"/>
+                                  </p:stCondLst>
+                                  <p:childTnLst>
+                                    <p:set>
+                                      <p:cBhvr>
+                                        <p:cTn id="14" dur="1" fill="hold">
+                                          <p:stCondLst>
+                                            <p:cond delay="0"/>
+                                          </p:stCondLst>
+                                        </p:cTn>
+                                        <p:tgtEl>
+                                          <p:spTgt spid="3">
+                                            <p:txEl>
+                                              <p:pRg st="3" end="3"/>
+                                            </p:txEl>
+                                          </p:spTgt>
+                                        </p:tgtEl>
+                                        <p:attrNameLst>
+                                          <p:attrName>style.visibility</p:attrName>
+                                        </p:attrNameLst>
+                                      </p:cBhvr>
+                                      <p:to>
+                                        <p:strVal val="visible"/>
+                                      </p:to>
+                                    </p:set>
+                                  </p:childTnLst>
+                                </p:cTn>
+                              </p:par>
+                              <p:par>
+                                <p:cTn id="15" presetID="1" presetClass="entr" presetSubtype="0" fill="hold" grpId="0" nodeType="withEffect">
+                                  <p:stCondLst>
+                                    <p:cond delay="0"/>
+                                  </p:stCondLst>
+                                  <p:childTnLst>
+                                    <p:set>
+                                      <p:cBhvr>
+                                        <p:cTn id="16" dur="1" fill="hold">
+                                          <p:stCondLst>
+                                            <p:cond delay="0"/>
+                                          </p:stCondLst>
+                                        </p:cTn>
+                                        <p:tgtEl>
+                                          <p:spTgt spid="3">
+                                            <p:txEl>
+                                              <p:pRg st="4" end="4"/>
+                                            </p:txEl>
+                                          </p:spTgt>
+                                        </p:tgtEl>
+                                        <p:attrNameLst>
+                                          <p:attrName>style.visibility</p:attrName>
+                                        </p:attrNameLst>
+                                      </p:cBhvr>
+                                      <p:to>
+                                        <p:strVal val="visible"/>
+                                      </p:to>
+                                    </p:set>
+                                  </p:childTnLst>
+                                </p:cTn>
+                              </p:par>
+                            </p:childTnLst>
+                          </p:cTn>
+                        </p:par>
+                      </p:childTnLst>
+                    </p:cTn>
+                  </p:par>
+                  <p:par>
+                    <p:cTn id="17" fill="hold">
+                      <p:stCondLst>
+                        <p:cond delay="indefinite"/>
+                      </p:stCondLst>
+                      <p:childTnLst>
+                        <p:par>
+                          <p:cTn id="18" fill="hold">
+                            <p:stCondLst>
+                              <p:cond delay="0"/>
+                            </p:stCondLst>
+                            <p:childTnLst>
+                              <p:par>
+                                <p:cTn id="19" presetID="1" presetClass="entr" presetSubtype="0" fill="hold" grpId="0" nodeType="clickEffect">
+                                  <p:stCondLst>
+                                    <p:cond delay="0"/>
+                                  </p:stCondLst>
+                                  <p:childTnLst>
+                                    <p:set>
+                                      <p:cBhvr>
+                                        <p:cTn id="20" dur="1" fill="hold">
+                                          <p:stCondLst>
+                                            <p:cond delay="0"/>
+                                          </p:stCondLst>
+                                        </p:cTn>
+                                        <p:tgtEl>
+                                          <p:spTgt spid="3">
+                                            <p:txEl>
+                                              <p:pRg st="5" end="5"/>
+                                            </p:txEl>
+                                          </p:spTgt>
+                                        </p:tgtEl>
+                                        <p:attrNameLst>
+                                          <p:attrName>style.visibility</p:attrName>
+                                        </p:attrNameLst>
+                                      </p:cBhvr>
+                                      <p:to>
+                                        <p:strVal val="visible"/>
+                                      </p:to>
+                                    </p:set>
+                                  </p:childTnLst>
+                                </p:cTn>
+                              </p:par>
+                              <p:par>
+                                <p:cTn id="21" presetID="1" presetClass="entr" presetSubtype="0" fill="hold" grpId="0" nodeType="withEffect">
+                                  <p:stCondLst>
+                                    <p:cond delay="0"/>
+                                  </p:stCondLst>
+                                  <p:childTnLst>
+                                    <p:set>
+                                      <p:cBhvr>
+                                        <p:cTn id="22" dur="1" fill="hold">
+                                          <p:stCondLst>
+                                            <p:cond delay="0"/>
+                                          </p:stCondLst>
+                                        </p:cTn>
+                                        <p:tgtEl>
+                                          <p:spTgt spid="3">
+                                            <p:txEl>
+                                              <p:pRg st="6" end="6"/>
+                                            </p:txEl>
+                                          </p:spTgt>
+                                        </p:tgtEl>
+                                        <p:attrNameLst>
+                                          <p:attrName>style.visibility</p:attrName>
+                                        </p:attrNameLst>
+                                      </p:cBhvr>
+                                      <p:to>
+                                        <p:strVal val="visible"/>
+                                      </p:to>
+                                    </p:set>
+                                  </p:childTnLst>
+                                </p:cTn>
+                              </p:par>
+                              <p:par>
+                                <p:cTn id="23" presetID="1" presetClass="entr" presetSubtype="0" fill="hold" grpId="0" nodeType="withEffect">
+                                  <p:stCondLst>
+                                    <p:cond delay="0"/>
+                                  </p:stCondLst>
+                                  <p:childTnLst>
+                                    <p:set>
+                                      <p:cBhvr>
+                                        <p:cTn id="24" dur="1" fill="hold">
+                                          <p:stCondLst>
+                                            <p:cond delay="0"/>
+                                          </p:stCondLst>
+                                        </p:cTn>
+                                        <p:tgtEl>
+                                          <p:spTgt spid="3">
+                                            <p:txEl>
+                                              <p:pRg st="7" end="7"/>
+                                            </p:txEl>
+                                          </p:spTgt>
+                                        </p:tgtEl>
+                                        <p:attrNameLst>
+                                          <p:attrName>style.visibility</p:attrName>
+                                        </p:attrNameLst>
+                                      </p:cBhvr>
+                                      <p:to>
+                                        <p:strVal val="visible"/>
+                                      </p:to>
+                                    </p:set>
+                                  </p:childTnLst>
+                                </p:cTn>
+                              </p:par>
+                            </p:childTnLst>
+                          </p:cTn>
+                        </p:par>
+                      </p:childTnLst>
+                    </p:cTn>
+                  </p:par>
+                  <p:par>
+                    <p:cTn id="25" fill="hold">
+                      <p:stCondLst>
+                        <p:cond delay="indefinite"/>
+                      </p:stCondLst>
+                      <p:childTnLst>
+                        <p:par>
+                          <p:cTn id="26" fill="hold">
+                            <p:stCondLst>
+                              <p:cond delay="0"/>
+                            </p:stCondLst>
+                            <p:childTnLst>
+                              <p:par>
+                                <p:cTn id="27" presetID="1" presetClass="entr" presetSubtype="0" fill="hold" grpId="0" nodeType="clickEffect">
+                                  <p:stCondLst>
+                                    <p:cond delay="0"/>
+                                  </p:stCondLst>
+                                  <p:childTnLst>
+                                    <p:set>
+                                      <p:cBhvr>
+                                        <p:cTn id="28" dur="1" fill="hold">
+                                          <p:stCondLst>
+                                            <p:cond delay="0"/>
+                                          </p:stCondLst>
+                                        </p:cTn>
+                                        <p:tgtEl>
+                                          <p:spTgt spid="3">
+                                            <p:txEl>
+                                              <p:pRg st="8" end="8"/>
+                                            </p:txEl>
+                                          </p:spTgt>
+                                        </p:tgtEl>
+                                        <p:attrNameLst>
+                                          <p:attrName>style.visibility</p:attrName>
+                                        </p:attrNameLst>
+                                      </p:cBhvr>
+                                      <p:to>
+                                        <p:strVal val="visible"/>
+                                      </p:to>
+                                    </p:set>
+                                  </p:childTnLst>
+                                </p:cTn>
+                              </p:par>
+                              <p:par>
+                                <p:cTn id="29" presetID="1" presetClass="entr" presetSubtype="0" fill="hold" grpId="0" nodeType="withEffect">
+                                  <p:stCondLst>
+                                    <p:cond delay="0"/>
+                                  </p:stCondLst>
+                                  <p:childTnLst>
+                                    <p:set>
+                                      <p:cBhvr>
+                                        <p:cTn id="30" dur="1" fill="hold">
+                                          <p:stCondLst>
+                                            <p:cond delay="0"/>
+                                          </p:stCondLst>
+                                        </p:cTn>
+                                        <p:tgtEl>
+                                          <p:spTgt spid="3">
+                                            <p:txEl>
+                                              <p:pRg st="9" end="9"/>
+                                            </p:txEl>
+                                          </p:spTgt>
+                                        </p:tgtEl>
+                                        <p:attrNameLst>
+                                          <p:attrName>style.visibility</p:attrName>
+                                        </p:attrNameLst>
+                                      </p:cBhvr>
+                                      <p:to>
+                                        <p:strVal val="visible"/>
+                                      </p:to>
+                                    </p:set>
+                                  </p:childTnLst>
+                                </p:cTn>
+                              </p:par>
+                              <p:par>
+                                <p:cTn id="31" presetID="1" presetClass="entr" presetSubtype="0" fill="hold" grpId="0" nodeType="withEffect">
+                                  <p:stCondLst>
+                                    <p:cond delay="0"/>
+                                  </p:stCondLst>
+                                  <p:childTnLst>
+                                    <p:set>
+                                      <p:cBhvr>
+                                        <p:cTn id="32" dur="1" fill="hold">
+                                          <p:stCondLst>
+                                            <p:cond delay="0"/>
+                                          </p:stCondLst>
+                                        </p:cTn>
+                                        <p:tgtEl>
+                                          <p:spTgt spid="3">
+                                            <p:txEl>
+                                              <p:pRg st="10" end="10"/>
+                                            </p:txEl>
+                                          </p:spTgt>
+                                        </p:tgtEl>
+                                        <p:attrNameLst>
+                                          <p:attrName>style.visibility</p:attrName>
+                                        </p:attrNameLst>
+                                      </p:cBhvr>
+                                      <p:to>
+                                        <p:strVal val="visible"/>
+                                      </p:to>
+                                    </p:set>
+                                  </p:childTnLst>
+                                </p:cTn>
+                              </p:par>
+                              <p:par>
+                                <p:cTn id="33" presetID="1" presetClass="entr" presetSubtype="0" fill="hold" grpId="0" nodeType="withEffect">
+                                  <p:stCondLst>
+                                    <p:cond delay="0"/>
+                                  </p:stCondLst>
+                                  <p:childTnLst>
+                                    <p:set>
+                                      <p:cBhvr>
+                                        <p:cTn id="34" dur="1" fill="hold">
+                                          <p:stCondLst>
+                                            <p:cond delay="0"/>
+                                          </p:stCondLst>
+                                        </p:cTn>
+                                        <p:tgtEl>
+                                          <p:spTgt spid="3">
+                                            <p:txEl>
+                                              <p:pRg st="11" end="11"/>
+                                            </p:txEl>
+                                          </p:spTgt>
+                                        </p:tgtEl>
+                                        <p:attrNameLst>
+                                          <p:attrName>style.visibility</p:attrName>
+                                        </p:attrNameLst>
+                                      </p:cBhvr>
+                                      <p:to>
+                                        <p:strVal val="visible"/>
+                                      </p:to>
+                                    </p:set>
+                                  </p:childTnLst>
+                                </p:cTn>
+                              </p:par>
+                              <p:par>
+                                <p:cTn id="35" presetID="1" presetClass="entr" presetSubtype="0" fill="hold" grpId="0" nodeType="withEffect">
+                                  <p:stCondLst>
+                                    <p:cond delay="0"/>
+                                  </p:stCondLst>
+                                  <p:childTnLst>
+                                    <p:set>
+                                      <p:cBhvr>
+                                        <p:cTn id="36" dur="1" fill="hold">
+                                          <p:stCondLst>
+                                            <p:cond delay="0"/>
+                                          </p:stCondLst>
+                                        </p:cTn>
+                                        <p:tgtEl>
+                                          <p:spTgt spid="3">
+                                            <p:txEl>
+                                              <p:pRg st="12" end="12"/>
+                                            </p:txEl>
+                                          </p:spTgt>
+                                        </p:tgtEl>
+                                        <p:attrNameLst>
+                                          <p:attrName>style.visibility</p:attrName>
+                                        </p:attrNameLst>
+                                      </p:cBhvr>
+                                      <p:to>
+                                        <p:strVal val="visible"/>
+                                      </p:to>
+                                    </p:set>
+                                  </p:childTnLst>
+                                </p:cTn>
+                              </p:par>
+                              <p:par>
+                                <p:cTn id="37" presetID="1" presetClass="entr" presetSubtype="0" fill="hold" grpId="0" nodeType="withEffect">
+                                  <p:stCondLst>
+                                    <p:cond delay="0"/>
+                                  </p:stCondLst>
+                                  <p:childTnLst>
+                                    <p:set>
+                                      <p:cBhvr>
+                                        <p:cTn id="38" dur="1" fill="hold">
+                                          <p:stCondLst>
+                                            <p:cond delay="0"/>
+                                          </p:stCondLst>
+                                        </p:cTn>
+                                        <p:tgtEl>
+                                          <p:spTgt spid="3">
+                                            <p:txEl>
+                                              <p:pRg st="13" end="13"/>
+                                            </p:txEl>
+                                          </p:spTgt>
+                                        </p:tgtEl>
+                                        <p:attrNameLst>
+                                          <p:attrName>style.visibility</p:attrName>
+                                        </p:attrNameLst>
+                                      </p:cBhvr>
+                                      <p:to>
+                                        <p:strVal val="visible"/>
+                                      </p:to>
+                                    </p:set>
+                                  </p:childTnLst>
+                                </p:cTn>
+                              </p:par>
+                            </p:childTnLst>
+                          </p:cTn>
+                        </p:par>
+                      </p:childTnLst>
+                    </p:cTn>
+                  </p:par>
+                </p:childTnLst>
+              </p:cTn>
+              <p:prevCondLst>
+                <p:cond evt="onPrev" delay="0">
+                  <p:tgtEl>
+                    <p:sldTgt/>
+                  </p:tgtEl>
+                </p:cond>
+              </p:prevCondLst>
+              <p:nextCondLst>
+                <p:cond evt="onNext" delay="0">
+                  <p:tgtEl>
+                    <p:sldTgt/>
+                  </p:tgtEl>
+                </p:cond>
+              </p:nextCondLst>
+            </p:seq>
+          </p:childTnLst>
+        </p:cTn>
+      </p:par>
+    </p:tnLst>
+    <p:bldLst>
+      <p:bldP spid="3" grpId="0" build="p"/>
+    </p:bldLst>
+  </p:timing>
 </p:sld>
 </file>
 

</xml_diff>